<commit_message>
debug and add fig
</commit_message>
<xml_diff>
--- a/fig/fig.pptx
+++ b/fig/fig.pptx
@@ -104,6 +104,11 @@
       </a:defRPr>
     </a:lvl9pPr>
   </p:defaultTextStyle>
+  <p:extLst>
+    <p:ext uri="{EFAFB233-063F-42B5-8137-9DF3F51BA10A}">
+      <p15:sldGuideLst xmlns:p15="http://schemas.microsoft.com/office/powerpoint/2012/main"/>
+    </p:ext>
+  </p:extLst>
 </p:presentation>
 </file>
 
@@ -238,7 +243,7 @@
           <a:p>
             <a:fld id="{FF3EFFB7-F378-40CB-A481-21C16C14FDD6}" type="datetimeFigureOut">
               <a:rPr lang="zh-TW" altLang="en-US" smtClean="0"/>
-              <a:t>2020/5/26</a:t>
+              <a:t>2020/5/28</a:t>
             </a:fld>
             <a:endParaRPr lang="zh-TW" altLang="en-US"/>
           </a:p>
@@ -408,7 +413,7 @@
           <a:p>
             <a:fld id="{FF3EFFB7-F378-40CB-A481-21C16C14FDD6}" type="datetimeFigureOut">
               <a:rPr lang="zh-TW" altLang="en-US" smtClean="0"/>
-              <a:t>2020/5/26</a:t>
+              <a:t>2020/5/28</a:t>
             </a:fld>
             <a:endParaRPr lang="zh-TW" altLang="en-US"/>
           </a:p>
@@ -588,7 +593,7 @@
           <a:p>
             <a:fld id="{FF3EFFB7-F378-40CB-A481-21C16C14FDD6}" type="datetimeFigureOut">
               <a:rPr lang="zh-TW" altLang="en-US" smtClean="0"/>
-              <a:t>2020/5/26</a:t>
+              <a:t>2020/5/28</a:t>
             </a:fld>
             <a:endParaRPr lang="zh-TW" altLang="en-US"/>
           </a:p>
@@ -758,7 +763,7 @@
           <a:p>
             <a:fld id="{FF3EFFB7-F378-40CB-A481-21C16C14FDD6}" type="datetimeFigureOut">
               <a:rPr lang="zh-TW" altLang="en-US" smtClean="0"/>
-              <a:t>2020/5/26</a:t>
+              <a:t>2020/5/28</a:t>
             </a:fld>
             <a:endParaRPr lang="zh-TW" altLang="en-US"/>
           </a:p>
@@ -1004,7 +1009,7 @@
           <a:p>
             <a:fld id="{FF3EFFB7-F378-40CB-A481-21C16C14FDD6}" type="datetimeFigureOut">
               <a:rPr lang="zh-TW" altLang="en-US" smtClean="0"/>
-              <a:t>2020/5/26</a:t>
+              <a:t>2020/5/28</a:t>
             </a:fld>
             <a:endParaRPr lang="zh-TW" altLang="en-US"/>
           </a:p>
@@ -1236,7 +1241,7 @@
           <a:p>
             <a:fld id="{FF3EFFB7-F378-40CB-A481-21C16C14FDD6}" type="datetimeFigureOut">
               <a:rPr lang="zh-TW" altLang="en-US" smtClean="0"/>
-              <a:t>2020/5/26</a:t>
+              <a:t>2020/5/28</a:t>
             </a:fld>
             <a:endParaRPr lang="zh-TW" altLang="en-US"/>
           </a:p>
@@ -1603,7 +1608,7 @@
           <a:p>
             <a:fld id="{FF3EFFB7-F378-40CB-A481-21C16C14FDD6}" type="datetimeFigureOut">
               <a:rPr lang="zh-TW" altLang="en-US" smtClean="0"/>
-              <a:t>2020/5/26</a:t>
+              <a:t>2020/5/28</a:t>
             </a:fld>
             <a:endParaRPr lang="zh-TW" altLang="en-US"/>
           </a:p>
@@ -1721,7 +1726,7 @@
           <a:p>
             <a:fld id="{FF3EFFB7-F378-40CB-A481-21C16C14FDD6}" type="datetimeFigureOut">
               <a:rPr lang="zh-TW" altLang="en-US" smtClean="0"/>
-              <a:t>2020/5/26</a:t>
+              <a:t>2020/5/28</a:t>
             </a:fld>
             <a:endParaRPr lang="zh-TW" altLang="en-US"/>
           </a:p>
@@ -1816,7 +1821,7 @@
           <a:p>
             <a:fld id="{FF3EFFB7-F378-40CB-A481-21C16C14FDD6}" type="datetimeFigureOut">
               <a:rPr lang="zh-TW" altLang="en-US" smtClean="0"/>
-              <a:t>2020/5/26</a:t>
+              <a:t>2020/5/28</a:t>
             </a:fld>
             <a:endParaRPr lang="zh-TW" altLang="en-US"/>
           </a:p>
@@ -2093,7 +2098,7 @@
           <a:p>
             <a:fld id="{FF3EFFB7-F378-40CB-A481-21C16C14FDD6}" type="datetimeFigureOut">
               <a:rPr lang="zh-TW" altLang="en-US" smtClean="0"/>
-              <a:t>2020/5/26</a:t>
+              <a:t>2020/5/28</a:t>
             </a:fld>
             <a:endParaRPr lang="zh-TW" altLang="en-US"/>
           </a:p>
@@ -2346,7 +2351,7 @@
           <a:p>
             <a:fld id="{FF3EFFB7-F378-40CB-A481-21C16C14FDD6}" type="datetimeFigureOut">
               <a:rPr lang="zh-TW" altLang="en-US" smtClean="0"/>
-              <a:t>2020/5/26</a:t>
+              <a:t>2020/5/28</a:t>
             </a:fld>
             <a:endParaRPr lang="zh-TW" altLang="en-US"/>
           </a:p>
@@ -2559,7 +2564,7 @@
           <a:p>
             <a:fld id="{FF3EFFB7-F378-40CB-A481-21C16C14FDD6}" type="datetimeFigureOut">
               <a:rPr lang="zh-TW" altLang="en-US" smtClean="0"/>
-              <a:t>2020/5/26</a:t>
+              <a:t>2020/5/28</a:t>
             </a:fld>
             <a:endParaRPr lang="zh-TW" altLang="en-US"/>
           </a:p>
@@ -2966,7 +2971,7 @@
       </p:grpSpPr>
       <p:pic>
         <p:nvPicPr>
-          <p:cNvPr id="2" name="圖片 1"/>
+          <p:cNvPr id="8" name="圖片 7"/>
           <p:cNvPicPr>
             <a:picLocks noChangeAspect="1"/>
           </p:cNvPicPr>
@@ -2986,7 +2991,7 @@
         </p:blipFill>
         <p:spPr>
           <a:xfrm>
-            <a:off x="0" y="450165"/>
+            <a:off x="4023360" y="450165"/>
             <a:ext cx="3931920" cy="5897880"/>
           </a:xfrm>
           <a:prstGeom prst="rect">
@@ -2996,7 +3001,7 @@
       </p:pic>
       <p:pic>
         <p:nvPicPr>
-          <p:cNvPr id="3" name="圖片 2"/>
+          <p:cNvPr id="2" name="圖片 1"/>
           <p:cNvPicPr>
             <a:picLocks noChangeAspect="1"/>
           </p:cNvPicPr>
@@ -3016,7 +3021,7 @@
         </p:blipFill>
         <p:spPr>
           <a:xfrm>
-            <a:off x="4023360" y="450165"/>
+            <a:off x="0" y="450165"/>
             <a:ext cx="3931920" cy="5897880"/>
           </a:xfrm>
           <a:prstGeom prst="rect">
@@ -3092,7 +3097,7 @@
         </p:nvSpPr>
         <p:spPr>
           <a:xfrm>
-            <a:off x="4103580" y="174951"/>
+            <a:off x="4023360" y="174951"/>
             <a:ext cx="447558" cy="369332"/>
           </a:xfrm>
           <a:prstGeom prst="rect">

</xml_diff>